<commit_message>
updates week 1 lecture notes
</commit_message>
<xml_diff>
--- a/lecture_notes/BIT_1.pptx
+++ b/lecture_notes/BIT_1.pptx
@@ -5,7 +5,7 @@
     <p:sldMasterId id="2147483660" r:id="rId1"/>
   </p:sldMasterIdLst>
   <p:notesMasterIdLst>
-    <p:notesMasterId r:id="rId10"/>
+    <p:notesMasterId r:id="rId14"/>
   </p:notesMasterIdLst>
   <p:sldIdLst>
     <p:sldId id="256" r:id="rId2"/>
@@ -16,6 +16,10 @@
     <p:sldId id="261" r:id="rId7"/>
     <p:sldId id="262" r:id="rId8"/>
     <p:sldId id="263" r:id="rId9"/>
+    <p:sldId id="264" r:id="rId10"/>
+    <p:sldId id="265" r:id="rId11"/>
+    <p:sldId id="266" r:id="rId12"/>
+    <p:sldId id="267" r:id="rId13"/>
   </p:sldIdLst>
   <p:sldSz cx="9144000" cy="6858000" type="screen4x3"/>
   <p:notesSz cx="6858000" cy="9144000"/>
@@ -204,7 +208,7 @@
           <a:p>
             <a:fld id="{6F704628-FD63-6D40-ADAF-B18E607582B8}" type="datetimeFigureOut">
               <a:rPr lang="tr-TR" smtClean="0"/>
-              <a:t>27.02.2025</a:t>
+              <a:t>4.03.2025</a:t>
             </a:fld>
             <a:endParaRPr lang="tr-TR"/>
           </a:p>
@@ -603,7 +607,7 @@
           <a:p>
             <a:fld id="{D59D1FFF-AC32-C349-997F-78463A7EB403}" type="datetimeFigureOut">
               <a:rPr lang="tr-TR" smtClean="0"/>
-              <a:t>27.02.2025</a:t>
+              <a:t>4.03.2025</a:t>
             </a:fld>
             <a:endParaRPr lang="tr-TR"/>
           </a:p>
@@ -773,7 +777,7 @@
           <a:p>
             <a:fld id="{D59D1FFF-AC32-C349-997F-78463A7EB403}" type="datetimeFigureOut">
               <a:rPr lang="tr-TR" smtClean="0"/>
-              <a:t>27.02.2025</a:t>
+              <a:t>4.03.2025</a:t>
             </a:fld>
             <a:endParaRPr lang="tr-TR"/>
           </a:p>
@@ -953,7 +957,7 @@
           <a:p>
             <a:fld id="{D59D1FFF-AC32-C349-997F-78463A7EB403}" type="datetimeFigureOut">
               <a:rPr lang="tr-TR" smtClean="0"/>
-              <a:t>27.02.2025</a:t>
+              <a:t>4.03.2025</a:t>
             </a:fld>
             <a:endParaRPr lang="tr-TR"/>
           </a:p>
@@ -1123,7 +1127,7 @@
           <a:p>
             <a:fld id="{D59D1FFF-AC32-C349-997F-78463A7EB403}" type="datetimeFigureOut">
               <a:rPr lang="tr-TR" smtClean="0"/>
-              <a:t>27.02.2025</a:t>
+              <a:t>4.03.2025</a:t>
             </a:fld>
             <a:endParaRPr lang="tr-TR"/>
           </a:p>
@@ -1369,7 +1373,7 @@
           <a:p>
             <a:fld id="{D59D1FFF-AC32-C349-997F-78463A7EB403}" type="datetimeFigureOut">
               <a:rPr lang="tr-TR" smtClean="0"/>
-              <a:t>27.02.2025</a:t>
+              <a:t>4.03.2025</a:t>
             </a:fld>
             <a:endParaRPr lang="tr-TR"/>
           </a:p>
@@ -1601,7 +1605,7 @@
           <a:p>
             <a:fld id="{D59D1FFF-AC32-C349-997F-78463A7EB403}" type="datetimeFigureOut">
               <a:rPr lang="tr-TR" smtClean="0"/>
-              <a:t>27.02.2025</a:t>
+              <a:t>4.03.2025</a:t>
             </a:fld>
             <a:endParaRPr lang="tr-TR"/>
           </a:p>
@@ -1968,7 +1972,7 @@
           <a:p>
             <a:fld id="{D59D1FFF-AC32-C349-997F-78463A7EB403}" type="datetimeFigureOut">
               <a:rPr lang="tr-TR" smtClean="0"/>
-              <a:t>27.02.2025</a:t>
+              <a:t>4.03.2025</a:t>
             </a:fld>
             <a:endParaRPr lang="tr-TR"/>
           </a:p>
@@ -2086,7 +2090,7 @@
           <a:p>
             <a:fld id="{D59D1FFF-AC32-C349-997F-78463A7EB403}" type="datetimeFigureOut">
               <a:rPr lang="tr-TR" smtClean="0"/>
-              <a:t>27.02.2025</a:t>
+              <a:t>4.03.2025</a:t>
             </a:fld>
             <a:endParaRPr lang="tr-TR"/>
           </a:p>
@@ -2181,7 +2185,7 @@
           <a:p>
             <a:fld id="{D59D1FFF-AC32-C349-997F-78463A7EB403}" type="datetimeFigureOut">
               <a:rPr lang="tr-TR" smtClean="0"/>
-              <a:t>27.02.2025</a:t>
+              <a:t>4.03.2025</a:t>
             </a:fld>
             <a:endParaRPr lang="tr-TR"/>
           </a:p>
@@ -2458,7 +2462,7 @@
           <a:p>
             <a:fld id="{D59D1FFF-AC32-C349-997F-78463A7EB403}" type="datetimeFigureOut">
               <a:rPr lang="tr-TR" smtClean="0"/>
-              <a:t>27.02.2025</a:t>
+              <a:t>4.03.2025</a:t>
             </a:fld>
             <a:endParaRPr lang="tr-TR"/>
           </a:p>
@@ -2715,7 +2719,7 @@
           <a:p>
             <a:fld id="{D59D1FFF-AC32-C349-997F-78463A7EB403}" type="datetimeFigureOut">
               <a:rPr lang="tr-TR" smtClean="0"/>
-              <a:t>27.02.2025</a:t>
+              <a:t>4.03.2025</a:t>
             </a:fld>
             <a:endParaRPr lang="tr-TR"/>
           </a:p>
@@ -2928,7 +2932,7 @@
           <a:p>
             <a:fld id="{D59D1FFF-AC32-C349-997F-78463A7EB403}" type="datetimeFigureOut">
               <a:rPr lang="tr-TR" smtClean="0"/>
-              <a:t>27.02.2025</a:t>
+              <a:t>4.03.2025</a:t>
             </a:fld>
             <a:endParaRPr lang="tr-TR"/>
           </a:p>
@@ -3464,6 +3468,1264 @@
 </p:sld>
 </file>
 
+<file path=ppt/slides/slide10.xml><?xml version="1.0" encoding="utf-8"?>
+<p:sld xmlns:a="http://schemas.openxmlformats.org/drawingml/2006/main" xmlns:r="http://schemas.openxmlformats.org/officeDocument/2006/relationships" xmlns:p="http://schemas.openxmlformats.org/presentationml/2006/main">
+  <p:cSld>
+    <p:spTree>
+      <p:nvGrpSpPr>
+        <p:cNvPr id="1" name="">
+          <a:extLst>
+            <a:ext uri="{FF2B5EF4-FFF2-40B4-BE49-F238E27FC236}">
+              <a16:creationId xmlns:a16="http://schemas.microsoft.com/office/drawing/2014/main" id="{6D3D2A64-A8FE-B954-7B94-534E8A783E45}"/>
+            </a:ext>
+          </a:extLst>
+        </p:cNvPr>
+        <p:cNvGrpSpPr/>
+        <p:nvPr/>
+      </p:nvGrpSpPr>
+      <p:grpSpPr>
+        <a:xfrm>
+          <a:off x="0" y="0"/>
+          <a:ext cx="0" cy="0"/>
+          <a:chOff x="0" y="0"/>
+          <a:chExt cx="0" cy="0"/>
+        </a:xfrm>
+      </p:grpSpPr>
+      <p:sp>
+        <p:nvSpPr>
+          <p:cNvPr id="2" name="Title 1">
+            <a:extLst>
+              <a:ext uri="{FF2B5EF4-FFF2-40B4-BE49-F238E27FC236}">
+                <a16:creationId xmlns:a16="http://schemas.microsoft.com/office/drawing/2014/main" id="{37F3F47A-3A60-ACAE-97AF-D40E5FC78567}"/>
+              </a:ext>
+            </a:extLst>
+          </p:cNvPr>
+          <p:cNvSpPr>
+            <a:spLocks noGrp="1"/>
+          </p:cNvSpPr>
+          <p:nvPr>
+            <p:ph type="title"/>
+          </p:nvPr>
+        </p:nvSpPr>
+        <p:spPr/>
+        <p:txBody>
+          <a:bodyPr/>
+          <a:lstStyle/>
+          <a:p>
+            <a:r>
+              <a:rPr lang="en-US" noProof="0" dirty="0"/>
+              <a:t>Boolean Algebra</a:t>
+            </a:r>
+          </a:p>
+        </p:txBody>
+      </p:sp>
+      <p:graphicFrame>
+        <p:nvGraphicFramePr>
+          <p:cNvPr id="4" name="Content Placeholder 3">
+            <a:extLst>
+              <a:ext uri="{FF2B5EF4-FFF2-40B4-BE49-F238E27FC236}">
+                <a16:creationId xmlns:a16="http://schemas.microsoft.com/office/drawing/2014/main" id="{864E7E37-311B-2F41-758A-0FA692ED11F7}"/>
+              </a:ext>
+            </a:extLst>
+          </p:cNvPr>
+          <p:cNvGraphicFramePr>
+            <a:graphicFrameLocks noGrp="1"/>
+          </p:cNvGraphicFramePr>
+          <p:nvPr>
+            <p:ph idx="1"/>
+            <p:extLst>
+              <p:ext uri="{D42A27DB-BD31-4B8C-83A1-F6EECF244321}">
+                <p14:modId xmlns:p14="http://schemas.microsoft.com/office/powerpoint/2010/main" val="3046513505"/>
+              </p:ext>
+            </p:extLst>
+          </p:nvPr>
+        </p:nvGraphicFramePr>
+        <p:xfrm>
+          <a:off x="759279" y="1814739"/>
+          <a:ext cx="4019552" cy="1854200"/>
+        </p:xfrm>
+        <a:graphic>
+          <a:graphicData uri="http://schemas.openxmlformats.org/drawingml/2006/table">
+            <a:tbl>
+              <a:tblPr firstRow="1" bandRow="1">
+                <a:tableStyleId>{5C22544A-7EE6-4342-B048-85BDC9FD1C3A}</a:tableStyleId>
+              </a:tblPr>
+              <a:tblGrid>
+                <a:gridCol w="1004888">
+                  <a:extLst>
+                    <a:ext uri="{9D8B030D-6E8A-4147-A177-3AD203B41FA5}">
+                      <a16:colId xmlns:a16="http://schemas.microsoft.com/office/drawing/2014/main" val="4214840927"/>
+                    </a:ext>
+                  </a:extLst>
+                </a:gridCol>
+                <a:gridCol w="1004888">
+                  <a:extLst>
+                    <a:ext uri="{9D8B030D-6E8A-4147-A177-3AD203B41FA5}">
+                      <a16:colId xmlns:a16="http://schemas.microsoft.com/office/drawing/2014/main" val="1446323586"/>
+                    </a:ext>
+                  </a:extLst>
+                </a:gridCol>
+                <a:gridCol w="1004888">
+                  <a:extLst>
+                    <a:ext uri="{9D8B030D-6E8A-4147-A177-3AD203B41FA5}">
+                      <a16:colId xmlns:a16="http://schemas.microsoft.com/office/drawing/2014/main" val="996208343"/>
+                    </a:ext>
+                  </a:extLst>
+                </a:gridCol>
+                <a:gridCol w="1004888">
+                  <a:extLst>
+                    <a:ext uri="{9D8B030D-6E8A-4147-A177-3AD203B41FA5}">
+                      <a16:colId xmlns:a16="http://schemas.microsoft.com/office/drawing/2014/main" val="564705416"/>
+                    </a:ext>
+                  </a:extLst>
+                </a:gridCol>
+              </a:tblGrid>
+              <a:tr h="370840">
+                <a:tc>
+                  <a:txBody>
+                    <a:bodyPr/>
+                    <a:lstStyle/>
+                    <a:p>
+                      <a:r>
+                        <a:rPr lang="tr-TR" dirty="0"/>
+                        <a:t>x</a:t>
+                      </a:r>
+                    </a:p>
+                  </a:txBody>
+                  <a:tcPr/>
+                </a:tc>
+                <a:tc>
+                  <a:txBody>
+                    <a:bodyPr/>
+                    <a:lstStyle/>
+                    <a:p>
+                      <a:r>
+                        <a:rPr lang="tr-TR" dirty="0"/>
+                        <a:t>y</a:t>
+                      </a:r>
+                    </a:p>
+                  </a:txBody>
+                  <a:tcPr/>
+                </a:tc>
+                <a:tc>
+                  <a:txBody>
+                    <a:bodyPr/>
+                    <a:lstStyle/>
+                    <a:p>
+                      <a:r>
+                        <a:rPr lang="tr-TR" dirty="0"/>
+                        <a:t>x </a:t>
+                      </a:r>
+                      <a:r>
+                        <a:rPr lang="tr-TR" dirty="0" err="1"/>
+                        <a:t>and</a:t>
+                      </a:r>
+                      <a:r>
+                        <a:rPr lang="tr-TR" dirty="0"/>
+                        <a:t> y</a:t>
+                      </a:r>
+                    </a:p>
+                  </a:txBody>
+                  <a:tcPr/>
+                </a:tc>
+                <a:tc>
+                  <a:txBody>
+                    <a:bodyPr/>
+                    <a:lstStyle/>
+                    <a:p>
+                      <a:r>
+                        <a:rPr lang="tr-TR" dirty="0"/>
+                        <a:t>x </a:t>
+                      </a:r>
+                      <a:r>
+                        <a:rPr lang="tr-TR" dirty="0" err="1"/>
+                        <a:t>or</a:t>
+                      </a:r>
+                      <a:r>
+                        <a:rPr lang="tr-TR" dirty="0"/>
+                        <a:t> y</a:t>
+                      </a:r>
+                    </a:p>
+                  </a:txBody>
+                  <a:tcPr/>
+                </a:tc>
+                <a:extLst>
+                  <a:ext uri="{0D108BD9-81ED-4DB2-BD59-A6C34878D82A}">
+                    <a16:rowId xmlns:a16="http://schemas.microsoft.com/office/drawing/2014/main" val="2379114413"/>
+                  </a:ext>
+                </a:extLst>
+              </a:tr>
+              <a:tr h="370840">
+                <a:tc>
+                  <a:txBody>
+                    <a:bodyPr/>
+                    <a:lstStyle/>
+                    <a:p>
+                      <a:r>
+                        <a:rPr lang="tr-TR" dirty="0"/>
+                        <a:t>F</a:t>
+                      </a:r>
+                    </a:p>
+                  </a:txBody>
+                  <a:tcPr/>
+                </a:tc>
+                <a:tc>
+                  <a:txBody>
+                    <a:bodyPr/>
+                    <a:lstStyle/>
+                    <a:p>
+                      <a:r>
+                        <a:rPr lang="tr-TR" dirty="0"/>
+                        <a:t>F</a:t>
+                      </a:r>
+                    </a:p>
+                  </a:txBody>
+                  <a:tcPr/>
+                </a:tc>
+                <a:tc>
+                  <a:txBody>
+                    <a:bodyPr/>
+                    <a:lstStyle/>
+                    <a:p>
+                      <a:r>
+                        <a:rPr lang="tr-TR" dirty="0"/>
+                        <a:t>F</a:t>
+                      </a:r>
+                    </a:p>
+                  </a:txBody>
+                  <a:tcPr/>
+                </a:tc>
+                <a:tc>
+                  <a:txBody>
+                    <a:bodyPr/>
+                    <a:lstStyle/>
+                    <a:p>
+                      <a:r>
+                        <a:rPr lang="tr-TR" dirty="0"/>
+                        <a:t>F</a:t>
+                      </a:r>
+                    </a:p>
+                  </a:txBody>
+                  <a:tcPr/>
+                </a:tc>
+                <a:extLst>
+                  <a:ext uri="{0D108BD9-81ED-4DB2-BD59-A6C34878D82A}">
+                    <a16:rowId xmlns:a16="http://schemas.microsoft.com/office/drawing/2014/main" val="1475768357"/>
+                  </a:ext>
+                </a:extLst>
+              </a:tr>
+              <a:tr h="370840">
+                <a:tc>
+                  <a:txBody>
+                    <a:bodyPr/>
+                    <a:lstStyle/>
+                    <a:p>
+                      <a:r>
+                        <a:rPr lang="tr-TR" dirty="0"/>
+                        <a:t>F</a:t>
+                      </a:r>
+                    </a:p>
+                  </a:txBody>
+                  <a:tcPr/>
+                </a:tc>
+                <a:tc>
+                  <a:txBody>
+                    <a:bodyPr/>
+                    <a:lstStyle/>
+                    <a:p>
+                      <a:r>
+                        <a:rPr lang="tr-TR" dirty="0"/>
+                        <a:t>T</a:t>
+                      </a:r>
+                    </a:p>
+                  </a:txBody>
+                  <a:tcPr/>
+                </a:tc>
+                <a:tc>
+                  <a:txBody>
+                    <a:bodyPr/>
+                    <a:lstStyle/>
+                    <a:p>
+                      <a:r>
+                        <a:rPr lang="tr-TR" dirty="0"/>
+                        <a:t>F</a:t>
+                      </a:r>
+                    </a:p>
+                  </a:txBody>
+                  <a:tcPr/>
+                </a:tc>
+                <a:tc>
+                  <a:txBody>
+                    <a:bodyPr/>
+                    <a:lstStyle/>
+                    <a:p>
+                      <a:r>
+                        <a:rPr lang="tr-TR" dirty="0"/>
+                        <a:t>T</a:t>
+                      </a:r>
+                    </a:p>
+                  </a:txBody>
+                  <a:tcPr/>
+                </a:tc>
+                <a:extLst>
+                  <a:ext uri="{0D108BD9-81ED-4DB2-BD59-A6C34878D82A}">
+                    <a16:rowId xmlns:a16="http://schemas.microsoft.com/office/drawing/2014/main" val="460903230"/>
+                  </a:ext>
+                </a:extLst>
+              </a:tr>
+              <a:tr h="370840">
+                <a:tc>
+                  <a:txBody>
+                    <a:bodyPr/>
+                    <a:lstStyle/>
+                    <a:p>
+                      <a:r>
+                        <a:rPr lang="tr-TR" dirty="0"/>
+                        <a:t>T</a:t>
+                      </a:r>
+                    </a:p>
+                  </a:txBody>
+                  <a:tcPr/>
+                </a:tc>
+                <a:tc>
+                  <a:txBody>
+                    <a:bodyPr/>
+                    <a:lstStyle/>
+                    <a:p>
+                      <a:r>
+                        <a:rPr lang="tr-TR" dirty="0"/>
+                        <a:t>F</a:t>
+                      </a:r>
+                    </a:p>
+                  </a:txBody>
+                  <a:tcPr/>
+                </a:tc>
+                <a:tc>
+                  <a:txBody>
+                    <a:bodyPr/>
+                    <a:lstStyle/>
+                    <a:p>
+                      <a:r>
+                        <a:rPr lang="tr-TR" dirty="0"/>
+                        <a:t>F</a:t>
+                      </a:r>
+                    </a:p>
+                  </a:txBody>
+                  <a:tcPr/>
+                </a:tc>
+                <a:tc>
+                  <a:txBody>
+                    <a:bodyPr/>
+                    <a:lstStyle/>
+                    <a:p>
+                      <a:r>
+                        <a:rPr lang="tr-TR" dirty="0"/>
+                        <a:t>T</a:t>
+                      </a:r>
+                    </a:p>
+                  </a:txBody>
+                  <a:tcPr/>
+                </a:tc>
+                <a:extLst>
+                  <a:ext uri="{0D108BD9-81ED-4DB2-BD59-A6C34878D82A}">
+                    <a16:rowId xmlns:a16="http://schemas.microsoft.com/office/drawing/2014/main" val="2032623655"/>
+                  </a:ext>
+                </a:extLst>
+              </a:tr>
+              <a:tr h="370840">
+                <a:tc>
+                  <a:txBody>
+                    <a:bodyPr/>
+                    <a:lstStyle/>
+                    <a:p>
+                      <a:r>
+                        <a:rPr lang="tr-TR" dirty="0"/>
+                        <a:t>T</a:t>
+                      </a:r>
+                    </a:p>
+                  </a:txBody>
+                  <a:tcPr/>
+                </a:tc>
+                <a:tc>
+                  <a:txBody>
+                    <a:bodyPr/>
+                    <a:lstStyle/>
+                    <a:p>
+                      <a:r>
+                        <a:rPr lang="tr-TR" dirty="0"/>
+                        <a:t>T</a:t>
+                      </a:r>
+                    </a:p>
+                  </a:txBody>
+                  <a:tcPr/>
+                </a:tc>
+                <a:tc>
+                  <a:txBody>
+                    <a:bodyPr/>
+                    <a:lstStyle/>
+                    <a:p>
+                      <a:r>
+                        <a:rPr lang="tr-TR" dirty="0"/>
+                        <a:t>T</a:t>
+                      </a:r>
+                    </a:p>
+                  </a:txBody>
+                  <a:tcPr/>
+                </a:tc>
+                <a:tc>
+                  <a:txBody>
+                    <a:bodyPr/>
+                    <a:lstStyle/>
+                    <a:p>
+                      <a:r>
+                        <a:rPr lang="tr-TR" dirty="0"/>
+                        <a:t>T</a:t>
+                      </a:r>
+                    </a:p>
+                  </a:txBody>
+                  <a:tcPr/>
+                </a:tc>
+                <a:extLst>
+                  <a:ext uri="{0D108BD9-81ED-4DB2-BD59-A6C34878D82A}">
+                    <a16:rowId xmlns:a16="http://schemas.microsoft.com/office/drawing/2014/main" val="97963873"/>
+                  </a:ext>
+                </a:extLst>
+              </a:tr>
+            </a:tbl>
+          </a:graphicData>
+        </a:graphic>
+      </p:graphicFrame>
+      <p:graphicFrame>
+        <p:nvGraphicFramePr>
+          <p:cNvPr id="5" name="Content Placeholder 3">
+            <a:extLst>
+              <a:ext uri="{FF2B5EF4-FFF2-40B4-BE49-F238E27FC236}">
+                <a16:creationId xmlns:a16="http://schemas.microsoft.com/office/drawing/2014/main" id="{4C552BCE-BF68-54DC-0E39-4F3DE4687C52}"/>
+              </a:ext>
+            </a:extLst>
+          </p:cNvPr>
+          <p:cNvGraphicFramePr>
+            <a:graphicFrameLocks/>
+          </p:cNvGraphicFramePr>
+          <p:nvPr>
+            <p:extLst>
+              <p:ext uri="{D42A27DB-BD31-4B8C-83A1-F6EECF244321}">
+                <p14:modId xmlns:p14="http://schemas.microsoft.com/office/powerpoint/2010/main" val="146951066"/>
+              </p:ext>
+            </p:extLst>
+          </p:nvPr>
+        </p:nvGraphicFramePr>
+        <p:xfrm>
+          <a:off x="759279" y="4187825"/>
+          <a:ext cx="2009776" cy="1112520"/>
+        </p:xfrm>
+        <a:graphic>
+          <a:graphicData uri="http://schemas.openxmlformats.org/drawingml/2006/table">
+            <a:tbl>
+              <a:tblPr firstRow="1" bandRow="1">
+                <a:tableStyleId>{5C22544A-7EE6-4342-B048-85BDC9FD1C3A}</a:tableStyleId>
+              </a:tblPr>
+              <a:tblGrid>
+                <a:gridCol w="1004888">
+                  <a:extLst>
+                    <a:ext uri="{9D8B030D-6E8A-4147-A177-3AD203B41FA5}">
+                      <a16:colId xmlns:a16="http://schemas.microsoft.com/office/drawing/2014/main" val="4214840927"/>
+                    </a:ext>
+                  </a:extLst>
+                </a:gridCol>
+                <a:gridCol w="1004888">
+                  <a:extLst>
+                    <a:ext uri="{9D8B030D-6E8A-4147-A177-3AD203B41FA5}">
+                      <a16:colId xmlns:a16="http://schemas.microsoft.com/office/drawing/2014/main" val="564705416"/>
+                    </a:ext>
+                  </a:extLst>
+                </a:gridCol>
+              </a:tblGrid>
+              <a:tr h="370840">
+                <a:tc>
+                  <a:txBody>
+                    <a:bodyPr/>
+                    <a:lstStyle/>
+                    <a:p>
+                      <a:r>
+                        <a:rPr lang="tr-TR" dirty="0"/>
+                        <a:t>x</a:t>
+                      </a:r>
+                    </a:p>
+                  </a:txBody>
+                  <a:tcPr/>
+                </a:tc>
+                <a:tc>
+                  <a:txBody>
+                    <a:bodyPr/>
+                    <a:lstStyle/>
+                    <a:p>
+                      <a:r>
+                        <a:rPr lang="tr-TR" dirty="0"/>
+                        <a:t>not x</a:t>
+                      </a:r>
+                    </a:p>
+                  </a:txBody>
+                  <a:tcPr/>
+                </a:tc>
+                <a:extLst>
+                  <a:ext uri="{0D108BD9-81ED-4DB2-BD59-A6C34878D82A}">
+                    <a16:rowId xmlns:a16="http://schemas.microsoft.com/office/drawing/2014/main" val="2379114413"/>
+                  </a:ext>
+                </a:extLst>
+              </a:tr>
+              <a:tr h="370840">
+                <a:tc>
+                  <a:txBody>
+                    <a:bodyPr/>
+                    <a:lstStyle/>
+                    <a:p>
+                      <a:r>
+                        <a:rPr lang="tr-TR" dirty="0"/>
+                        <a:t>F</a:t>
+                      </a:r>
+                    </a:p>
+                  </a:txBody>
+                  <a:tcPr/>
+                </a:tc>
+                <a:tc>
+                  <a:txBody>
+                    <a:bodyPr/>
+                    <a:lstStyle/>
+                    <a:p>
+                      <a:r>
+                        <a:rPr lang="tr-TR" dirty="0"/>
+                        <a:t>T</a:t>
+                      </a:r>
+                    </a:p>
+                  </a:txBody>
+                  <a:tcPr/>
+                </a:tc>
+                <a:extLst>
+                  <a:ext uri="{0D108BD9-81ED-4DB2-BD59-A6C34878D82A}">
+                    <a16:rowId xmlns:a16="http://schemas.microsoft.com/office/drawing/2014/main" val="1475768357"/>
+                  </a:ext>
+                </a:extLst>
+              </a:tr>
+              <a:tr h="370840">
+                <a:tc>
+                  <a:txBody>
+                    <a:bodyPr/>
+                    <a:lstStyle/>
+                    <a:p>
+                      <a:r>
+                        <a:rPr lang="tr-TR" dirty="0"/>
+                        <a:t>T</a:t>
+                      </a:r>
+                    </a:p>
+                  </a:txBody>
+                  <a:tcPr/>
+                </a:tc>
+                <a:tc>
+                  <a:txBody>
+                    <a:bodyPr/>
+                    <a:lstStyle/>
+                    <a:p>
+                      <a:r>
+                        <a:rPr lang="tr-TR" dirty="0"/>
+                        <a:t>F</a:t>
+                      </a:r>
+                    </a:p>
+                  </a:txBody>
+                  <a:tcPr/>
+                </a:tc>
+                <a:extLst>
+                  <a:ext uri="{0D108BD9-81ED-4DB2-BD59-A6C34878D82A}">
+                    <a16:rowId xmlns:a16="http://schemas.microsoft.com/office/drawing/2014/main" val="460903230"/>
+                  </a:ext>
+                </a:extLst>
+              </a:tr>
+            </a:tbl>
+          </a:graphicData>
+        </a:graphic>
+      </p:graphicFrame>
+    </p:spTree>
+    <p:extLst>
+      <p:ext uri="{BB962C8B-B14F-4D97-AF65-F5344CB8AC3E}">
+        <p14:creationId xmlns:p14="http://schemas.microsoft.com/office/powerpoint/2010/main" val="1099807485"/>
+      </p:ext>
+    </p:extLst>
+  </p:cSld>
+  <p:clrMapOvr>
+    <a:masterClrMapping/>
+  </p:clrMapOvr>
+</p:sld>
+</file>
+
+<file path=ppt/slides/slide11.xml><?xml version="1.0" encoding="utf-8"?>
+<p:sld xmlns:a="http://schemas.openxmlformats.org/drawingml/2006/main" xmlns:r="http://schemas.openxmlformats.org/officeDocument/2006/relationships" xmlns:p="http://schemas.openxmlformats.org/presentationml/2006/main">
+  <p:cSld>
+    <p:spTree>
+      <p:nvGrpSpPr>
+        <p:cNvPr id="1" name="">
+          <a:extLst>
+            <a:ext uri="{FF2B5EF4-FFF2-40B4-BE49-F238E27FC236}">
+              <a16:creationId xmlns:a16="http://schemas.microsoft.com/office/drawing/2014/main" id="{F83200FA-1593-2175-D7B1-9E70F8B9C5C5}"/>
+            </a:ext>
+          </a:extLst>
+        </p:cNvPr>
+        <p:cNvGrpSpPr/>
+        <p:nvPr/>
+      </p:nvGrpSpPr>
+      <p:grpSpPr>
+        <a:xfrm>
+          <a:off x="0" y="0"/>
+          <a:ext cx="0" cy="0"/>
+          <a:chOff x="0" y="0"/>
+          <a:chExt cx="0" cy="0"/>
+        </a:xfrm>
+      </p:grpSpPr>
+      <p:sp>
+        <p:nvSpPr>
+          <p:cNvPr id="2" name="Title 1">
+            <a:extLst>
+              <a:ext uri="{FF2B5EF4-FFF2-40B4-BE49-F238E27FC236}">
+                <a16:creationId xmlns:a16="http://schemas.microsoft.com/office/drawing/2014/main" id="{1CFC32AC-A53D-E14D-AAAB-71220B18F0C6}"/>
+              </a:ext>
+            </a:extLst>
+          </p:cNvPr>
+          <p:cNvSpPr>
+            <a:spLocks noGrp="1"/>
+          </p:cNvSpPr>
+          <p:nvPr>
+            <p:ph type="title"/>
+          </p:nvPr>
+        </p:nvSpPr>
+        <p:spPr/>
+        <p:txBody>
+          <a:bodyPr/>
+          <a:lstStyle/>
+          <a:p>
+            <a:r>
+              <a:rPr lang="en-US" noProof="0" dirty="0"/>
+              <a:t>Comparison Operators</a:t>
+            </a:r>
+          </a:p>
+        </p:txBody>
+      </p:sp>
+      <p:graphicFrame>
+        <p:nvGraphicFramePr>
+          <p:cNvPr id="4" name="Content Placeholder 3">
+            <a:extLst>
+              <a:ext uri="{FF2B5EF4-FFF2-40B4-BE49-F238E27FC236}">
+                <a16:creationId xmlns:a16="http://schemas.microsoft.com/office/drawing/2014/main" id="{14A03D73-EFFD-095E-8AA6-2F2FC64C69B3}"/>
+              </a:ext>
+            </a:extLst>
+          </p:cNvPr>
+          <p:cNvGraphicFramePr>
+            <a:graphicFrameLocks noGrp="1"/>
+          </p:cNvGraphicFramePr>
+          <p:nvPr>
+            <p:ph idx="1"/>
+            <p:extLst>
+              <p:ext uri="{D42A27DB-BD31-4B8C-83A1-F6EECF244321}">
+                <p14:modId xmlns:p14="http://schemas.microsoft.com/office/powerpoint/2010/main" val="1804657164"/>
+              </p:ext>
+            </p:extLst>
+          </p:nvPr>
+        </p:nvGraphicFramePr>
+        <p:xfrm>
+          <a:off x="759279" y="1814739"/>
+          <a:ext cx="5184322" cy="2595880"/>
+        </p:xfrm>
+        <a:graphic>
+          <a:graphicData uri="http://schemas.openxmlformats.org/drawingml/2006/table">
+            <a:tbl>
+              <a:tblPr firstRow="1" bandRow="1">
+                <a:tableStyleId>{5C22544A-7EE6-4342-B048-85BDC9FD1C3A}</a:tableStyleId>
+              </a:tblPr>
+              <a:tblGrid>
+                <a:gridCol w="1255363">
+                  <a:extLst>
+                    <a:ext uri="{9D8B030D-6E8A-4147-A177-3AD203B41FA5}">
+                      <a16:colId xmlns:a16="http://schemas.microsoft.com/office/drawing/2014/main" val="4214840927"/>
+                    </a:ext>
+                  </a:extLst>
+                </a:gridCol>
+                <a:gridCol w="2375418">
+                  <a:extLst>
+                    <a:ext uri="{9D8B030D-6E8A-4147-A177-3AD203B41FA5}">
+                      <a16:colId xmlns:a16="http://schemas.microsoft.com/office/drawing/2014/main" val="1446323586"/>
+                    </a:ext>
+                  </a:extLst>
+                </a:gridCol>
+                <a:gridCol w="1553541">
+                  <a:extLst>
+                    <a:ext uri="{9D8B030D-6E8A-4147-A177-3AD203B41FA5}">
+                      <a16:colId xmlns:a16="http://schemas.microsoft.com/office/drawing/2014/main" val="996208343"/>
+                    </a:ext>
+                  </a:extLst>
+                </a:gridCol>
+              </a:tblGrid>
+              <a:tr h="370840">
+                <a:tc>
+                  <a:txBody>
+                    <a:bodyPr/>
+                    <a:lstStyle/>
+                    <a:p>
+                      <a:r>
+                        <a:rPr lang="tr-TR" dirty="0" err="1"/>
+                        <a:t>Operator</a:t>
+                      </a:r>
+                      <a:endParaRPr lang="tr-TR" dirty="0"/>
+                    </a:p>
+                  </a:txBody>
+                  <a:tcPr/>
+                </a:tc>
+                <a:tc>
+                  <a:txBody>
+                    <a:bodyPr/>
+                    <a:lstStyle/>
+                    <a:p>
+                      <a:r>
+                        <a:rPr lang="tr-TR" dirty="0"/>
+                        <a:t>Name</a:t>
+                      </a:r>
+                    </a:p>
+                  </a:txBody>
+                  <a:tcPr/>
+                </a:tc>
+                <a:tc>
+                  <a:txBody>
+                    <a:bodyPr/>
+                    <a:lstStyle/>
+                    <a:p>
+                      <a:r>
+                        <a:rPr lang="tr-TR" dirty="0" err="1"/>
+                        <a:t>Example</a:t>
+                      </a:r>
+                      <a:endParaRPr lang="tr-TR" dirty="0"/>
+                    </a:p>
+                  </a:txBody>
+                  <a:tcPr/>
+                </a:tc>
+                <a:extLst>
+                  <a:ext uri="{0D108BD9-81ED-4DB2-BD59-A6C34878D82A}">
+                    <a16:rowId xmlns:a16="http://schemas.microsoft.com/office/drawing/2014/main" val="2379114413"/>
+                  </a:ext>
+                </a:extLst>
+              </a:tr>
+              <a:tr h="370840">
+                <a:tc>
+                  <a:txBody>
+                    <a:bodyPr/>
+                    <a:lstStyle/>
+                    <a:p>
+                      <a:r>
+                        <a:rPr lang="tr-TR" dirty="0"/>
+                        <a:t>==</a:t>
+                      </a:r>
+                    </a:p>
+                  </a:txBody>
+                  <a:tcPr/>
+                </a:tc>
+                <a:tc>
+                  <a:txBody>
+                    <a:bodyPr/>
+                    <a:lstStyle/>
+                    <a:p>
+                      <a:r>
+                        <a:rPr lang="tr-TR" dirty="0" err="1"/>
+                        <a:t>Equal</a:t>
+                      </a:r>
+                      <a:endParaRPr lang="tr-TR" dirty="0"/>
+                    </a:p>
+                  </a:txBody>
+                  <a:tcPr/>
+                </a:tc>
+                <a:tc>
+                  <a:txBody>
+                    <a:bodyPr/>
+                    <a:lstStyle/>
+                    <a:p>
+                      <a:r>
+                        <a:rPr lang="tr-TR" dirty="0"/>
+                        <a:t>2 == 5</a:t>
+                      </a:r>
+                    </a:p>
+                  </a:txBody>
+                  <a:tcPr/>
+                </a:tc>
+                <a:extLst>
+                  <a:ext uri="{0D108BD9-81ED-4DB2-BD59-A6C34878D82A}">
+                    <a16:rowId xmlns:a16="http://schemas.microsoft.com/office/drawing/2014/main" val="1475768357"/>
+                  </a:ext>
+                </a:extLst>
+              </a:tr>
+              <a:tr h="370840">
+                <a:tc>
+                  <a:txBody>
+                    <a:bodyPr/>
+                    <a:lstStyle/>
+                    <a:p>
+                      <a:r>
+                        <a:rPr lang="tr-TR" dirty="0"/>
+                        <a:t>!=</a:t>
+                      </a:r>
+                    </a:p>
+                  </a:txBody>
+                  <a:tcPr/>
+                </a:tc>
+                <a:tc>
+                  <a:txBody>
+                    <a:bodyPr/>
+                    <a:lstStyle/>
+                    <a:p>
+                      <a:r>
+                        <a:rPr lang="tr-TR" dirty="0"/>
+                        <a:t>Not </a:t>
+                      </a:r>
+                      <a:r>
+                        <a:rPr lang="tr-TR" dirty="0" err="1"/>
+                        <a:t>equal</a:t>
+                      </a:r>
+                      <a:endParaRPr lang="tr-TR" dirty="0"/>
+                    </a:p>
+                  </a:txBody>
+                  <a:tcPr/>
+                </a:tc>
+                <a:tc>
+                  <a:txBody>
+                    <a:bodyPr/>
+                    <a:lstStyle/>
+                    <a:p>
+                      <a:r>
+                        <a:rPr lang="tr-TR" dirty="0"/>
+                        <a:t>2 != 5</a:t>
+                      </a:r>
+                    </a:p>
+                  </a:txBody>
+                  <a:tcPr/>
+                </a:tc>
+                <a:extLst>
+                  <a:ext uri="{0D108BD9-81ED-4DB2-BD59-A6C34878D82A}">
+                    <a16:rowId xmlns:a16="http://schemas.microsoft.com/office/drawing/2014/main" val="460903230"/>
+                  </a:ext>
+                </a:extLst>
+              </a:tr>
+              <a:tr h="370840">
+                <a:tc>
+                  <a:txBody>
+                    <a:bodyPr/>
+                    <a:lstStyle/>
+                    <a:p>
+                      <a:r>
+                        <a:rPr lang="tr-TR" dirty="0"/>
+                        <a:t>&gt;</a:t>
+                      </a:r>
+                    </a:p>
+                  </a:txBody>
+                  <a:tcPr/>
+                </a:tc>
+                <a:tc>
+                  <a:txBody>
+                    <a:bodyPr/>
+                    <a:lstStyle/>
+                    <a:p>
+                      <a:r>
+                        <a:rPr lang="tr-TR" dirty="0" err="1"/>
+                        <a:t>Greater</a:t>
+                      </a:r>
+                      <a:r>
+                        <a:rPr lang="tr-TR" dirty="0"/>
+                        <a:t> </a:t>
+                      </a:r>
+                      <a:r>
+                        <a:rPr lang="tr-TR" dirty="0" err="1"/>
+                        <a:t>than</a:t>
+                      </a:r>
+                      <a:endParaRPr lang="tr-TR" dirty="0"/>
+                    </a:p>
+                  </a:txBody>
+                  <a:tcPr/>
+                </a:tc>
+                <a:tc>
+                  <a:txBody>
+                    <a:bodyPr/>
+                    <a:lstStyle/>
+                    <a:p>
+                      <a:r>
+                        <a:rPr lang="tr-TR" dirty="0"/>
+                        <a:t>2 &gt; 5</a:t>
+                      </a:r>
+                    </a:p>
+                  </a:txBody>
+                  <a:tcPr/>
+                </a:tc>
+                <a:extLst>
+                  <a:ext uri="{0D108BD9-81ED-4DB2-BD59-A6C34878D82A}">
+                    <a16:rowId xmlns:a16="http://schemas.microsoft.com/office/drawing/2014/main" val="2032623655"/>
+                  </a:ext>
+                </a:extLst>
+              </a:tr>
+              <a:tr h="370840">
+                <a:tc>
+                  <a:txBody>
+                    <a:bodyPr/>
+                    <a:lstStyle/>
+                    <a:p>
+                      <a:r>
+                        <a:rPr lang="tr-TR" dirty="0"/>
+                        <a:t>&lt;</a:t>
+                      </a:r>
+                    </a:p>
+                  </a:txBody>
+                  <a:tcPr/>
+                </a:tc>
+                <a:tc>
+                  <a:txBody>
+                    <a:bodyPr/>
+                    <a:lstStyle/>
+                    <a:p>
+                      <a:r>
+                        <a:rPr lang="tr-TR" dirty="0" err="1"/>
+                        <a:t>Less</a:t>
+                      </a:r>
+                      <a:r>
+                        <a:rPr lang="tr-TR" dirty="0"/>
+                        <a:t> </a:t>
+                      </a:r>
+                      <a:r>
+                        <a:rPr lang="tr-TR" dirty="0" err="1"/>
+                        <a:t>than</a:t>
+                      </a:r>
+                      <a:endParaRPr lang="tr-TR" dirty="0"/>
+                    </a:p>
+                  </a:txBody>
+                  <a:tcPr/>
+                </a:tc>
+                <a:tc>
+                  <a:txBody>
+                    <a:bodyPr/>
+                    <a:lstStyle/>
+                    <a:p>
+                      <a:r>
+                        <a:rPr lang="tr-TR" dirty="0"/>
+                        <a:t>2 &lt; 5</a:t>
+                      </a:r>
+                    </a:p>
+                  </a:txBody>
+                  <a:tcPr/>
+                </a:tc>
+                <a:extLst>
+                  <a:ext uri="{0D108BD9-81ED-4DB2-BD59-A6C34878D82A}">
+                    <a16:rowId xmlns:a16="http://schemas.microsoft.com/office/drawing/2014/main" val="97963873"/>
+                  </a:ext>
+                </a:extLst>
+              </a:tr>
+              <a:tr h="370840">
+                <a:tc>
+                  <a:txBody>
+                    <a:bodyPr/>
+                    <a:lstStyle/>
+                    <a:p>
+                      <a:r>
+                        <a:rPr lang="tr-TR" dirty="0"/>
+                        <a:t>&gt;=</a:t>
+                      </a:r>
+                    </a:p>
+                  </a:txBody>
+                  <a:tcPr/>
+                </a:tc>
+                <a:tc>
+                  <a:txBody>
+                    <a:bodyPr/>
+                    <a:lstStyle/>
+                    <a:p>
+                      <a:r>
+                        <a:rPr lang="tr-TR" dirty="0"/>
+                        <a:t>Gr. </a:t>
+                      </a:r>
+                      <a:r>
+                        <a:rPr lang="tr-TR" dirty="0" err="1"/>
+                        <a:t>th</a:t>
+                      </a:r>
+                      <a:r>
+                        <a:rPr lang="tr-TR" dirty="0"/>
+                        <a:t>. </a:t>
+                      </a:r>
+                      <a:r>
+                        <a:rPr lang="tr-TR" dirty="0" err="1"/>
+                        <a:t>or</a:t>
+                      </a:r>
+                      <a:r>
+                        <a:rPr lang="tr-TR" dirty="0"/>
+                        <a:t> </a:t>
+                      </a:r>
+                      <a:r>
+                        <a:rPr lang="tr-TR" dirty="0" err="1"/>
+                        <a:t>equal</a:t>
+                      </a:r>
+                      <a:endParaRPr lang="tr-TR" dirty="0"/>
+                    </a:p>
+                  </a:txBody>
+                  <a:tcPr/>
+                </a:tc>
+                <a:tc>
+                  <a:txBody>
+                    <a:bodyPr/>
+                    <a:lstStyle/>
+                    <a:p>
+                      <a:r>
+                        <a:rPr lang="tr-TR" dirty="0"/>
+                        <a:t>2 &gt;= 5</a:t>
+                      </a:r>
+                    </a:p>
+                  </a:txBody>
+                  <a:tcPr/>
+                </a:tc>
+                <a:extLst>
+                  <a:ext uri="{0D108BD9-81ED-4DB2-BD59-A6C34878D82A}">
+                    <a16:rowId xmlns:a16="http://schemas.microsoft.com/office/drawing/2014/main" val="2867008213"/>
+                  </a:ext>
+                </a:extLst>
+              </a:tr>
+              <a:tr h="370840">
+                <a:tc>
+                  <a:txBody>
+                    <a:bodyPr/>
+                    <a:lstStyle/>
+                    <a:p>
+                      <a:r>
+                        <a:rPr lang="tr-TR" dirty="0"/>
+                        <a:t>&lt;=</a:t>
+                      </a:r>
+                    </a:p>
+                  </a:txBody>
+                  <a:tcPr/>
+                </a:tc>
+                <a:tc>
+                  <a:txBody>
+                    <a:bodyPr/>
+                    <a:lstStyle/>
+                    <a:p>
+                      <a:r>
+                        <a:rPr lang="tr-TR" dirty="0" err="1"/>
+                        <a:t>Ls</a:t>
+                      </a:r>
+                      <a:r>
+                        <a:rPr lang="tr-TR" dirty="0"/>
+                        <a:t>. </a:t>
+                      </a:r>
+                      <a:r>
+                        <a:rPr lang="tr-TR" dirty="0" err="1"/>
+                        <a:t>th</a:t>
+                      </a:r>
+                      <a:r>
+                        <a:rPr lang="tr-TR" dirty="0"/>
+                        <a:t>. </a:t>
+                      </a:r>
+                      <a:r>
+                        <a:rPr lang="tr-TR" dirty="0" err="1"/>
+                        <a:t>or</a:t>
+                      </a:r>
+                      <a:r>
+                        <a:rPr lang="tr-TR" dirty="0"/>
+                        <a:t> </a:t>
+                      </a:r>
+                      <a:r>
+                        <a:rPr lang="tr-TR" dirty="0" err="1"/>
+                        <a:t>equal</a:t>
+                      </a:r>
+                      <a:endParaRPr lang="tr-TR" dirty="0"/>
+                    </a:p>
+                  </a:txBody>
+                  <a:tcPr/>
+                </a:tc>
+                <a:tc>
+                  <a:txBody>
+                    <a:bodyPr/>
+                    <a:lstStyle/>
+                    <a:p>
+                      <a:r>
+                        <a:rPr lang="tr-TR" dirty="0"/>
+                        <a:t>2 &lt;= 5</a:t>
+                      </a:r>
+                    </a:p>
+                  </a:txBody>
+                  <a:tcPr/>
+                </a:tc>
+                <a:extLst>
+                  <a:ext uri="{0D108BD9-81ED-4DB2-BD59-A6C34878D82A}">
+                    <a16:rowId xmlns:a16="http://schemas.microsoft.com/office/drawing/2014/main" val="2134224907"/>
+                  </a:ext>
+                </a:extLst>
+              </a:tr>
+            </a:tbl>
+          </a:graphicData>
+        </a:graphic>
+      </p:graphicFrame>
+      <p:sp>
+        <p:nvSpPr>
+          <p:cNvPr id="3" name="TextBox 2">
+            <a:extLst>
+              <a:ext uri="{FF2B5EF4-FFF2-40B4-BE49-F238E27FC236}">
+                <a16:creationId xmlns:a16="http://schemas.microsoft.com/office/drawing/2014/main" id="{7E0CBAC4-9DF1-AC00-A99D-C4F4490A33DE}"/>
+              </a:ext>
+            </a:extLst>
+          </p:cNvPr>
+          <p:cNvSpPr txBox="1"/>
+          <p:nvPr/>
+        </p:nvSpPr>
+        <p:spPr>
+          <a:xfrm>
+            <a:off x="759279" y="4702629"/>
+            <a:ext cx="7756071" cy="1477328"/>
+          </a:xfrm>
+          <a:prstGeom prst="rect">
+            <a:avLst/>
+          </a:prstGeom>
+          <a:noFill/>
+        </p:spPr>
+        <p:txBody>
+          <a:bodyPr wrap="square" rtlCol="0">
+            <a:spAutoFit/>
+          </a:bodyPr>
+          <a:lstStyle/>
+          <a:p>
+            <a:pPr marL="285750" indent="-285750">
+              <a:buFont typeface="Arial" panose="020B0604020202020204" pitchFamily="34" charset="0"/>
+              <a:buChar char="•"/>
+            </a:pPr>
+            <a:r>
+              <a:rPr lang="en-US" noProof="0" dirty="0"/>
+              <a:t>Arithmetic operators have higher precedence than the comparison operators.</a:t>
+            </a:r>
+          </a:p>
+          <a:p>
+            <a:pPr marL="285750" indent="-285750">
+              <a:buFont typeface="Arial" panose="020B0604020202020204" pitchFamily="34" charset="0"/>
+              <a:buChar char="•"/>
+            </a:pPr>
+            <a:r>
+              <a:rPr lang="en-US" noProof="0" dirty="0"/>
+              <a:t>Comparison operators have higher precedence than the </a:t>
+            </a:r>
+            <a:r>
+              <a:rPr lang="en-US" noProof="0" dirty="0" err="1"/>
+              <a:t>boolean</a:t>
+            </a:r>
+            <a:r>
+              <a:rPr lang="en-US" noProof="0" dirty="0"/>
+              <a:t> operators.</a:t>
+            </a:r>
+          </a:p>
+          <a:p>
+            <a:pPr marL="285750" indent="-285750">
+              <a:buFont typeface="Arial" panose="020B0604020202020204" pitchFamily="34" charset="0"/>
+              <a:buChar char="•"/>
+            </a:pPr>
+            <a:r>
+              <a:rPr lang="en-US" noProof="0" dirty="0"/>
+              <a:t>Not has higher precedence than and, or operators.</a:t>
+            </a:r>
+          </a:p>
+        </p:txBody>
+      </p:sp>
+    </p:spTree>
+    <p:extLst>
+      <p:ext uri="{BB962C8B-B14F-4D97-AF65-F5344CB8AC3E}">
+        <p14:creationId xmlns:p14="http://schemas.microsoft.com/office/powerpoint/2010/main" val="284051945"/>
+      </p:ext>
+    </p:extLst>
+  </p:cSld>
+  <p:clrMapOvr>
+    <a:masterClrMapping/>
+  </p:clrMapOvr>
+</p:sld>
+</file>
+
+<file path=ppt/slides/slide12.xml><?xml version="1.0" encoding="utf-8"?>
+<p:sld xmlns:a="http://schemas.openxmlformats.org/drawingml/2006/main" xmlns:r="http://schemas.openxmlformats.org/officeDocument/2006/relationships" xmlns:p="http://schemas.openxmlformats.org/presentationml/2006/main">
+  <p:cSld>
+    <p:spTree>
+      <p:nvGrpSpPr>
+        <p:cNvPr id="1" name=""/>
+        <p:cNvGrpSpPr/>
+        <p:nvPr/>
+      </p:nvGrpSpPr>
+      <p:grpSpPr>
+        <a:xfrm>
+          <a:off x="0" y="0"/>
+          <a:ext cx="0" cy="0"/>
+          <a:chOff x="0" y="0"/>
+          <a:chExt cx="0" cy="0"/>
+        </a:xfrm>
+      </p:grpSpPr>
+      <p:sp>
+        <p:nvSpPr>
+          <p:cNvPr id="2" name="Title 1">
+            <a:extLst>
+              <a:ext uri="{FF2B5EF4-FFF2-40B4-BE49-F238E27FC236}">
+                <a16:creationId xmlns:a16="http://schemas.microsoft.com/office/drawing/2014/main" id="{1B80FB47-D007-51A9-A3EE-CB59910B7A25}"/>
+              </a:ext>
+            </a:extLst>
+          </p:cNvPr>
+          <p:cNvSpPr>
+            <a:spLocks noGrp="1"/>
+          </p:cNvSpPr>
+          <p:nvPr>
+            <p:ph type="title"/>
+          </p:nvPr>
+        </p:nvSpPr>
+        <p:spPr/>
+        <p:txBody>
+          <a:bodyPr/>
+          <a:lstStyle/>
+          <a:p>
+            <a:r>
+              <a:rPr lang="en-US" noProof="0" dirty="0"/>
+              <a:t>Exercises</a:t>
+            </a:r>
+          </a:p>
+        </p:txBody>
+      </p:sp>
+      <p:sp>
+        <p:nvSpPr>
+          <p:cNvPr id="3" name="Content Placeholder 2">
+            <a:extLst>
+              <a:ext uri="{FF2B5EF4-FFF2-40B4-BE49-F238E27FC236}">
+                <a16:creationId xmlns:a16="http://schemas.microsoft.com/office/drawing/2014/main" id="{2B92EE57-EAAD-67FB-5368-E672E7F844CF}"/>
+              </a:ext>
+            </a:extLst>
+          </p:cNvPr>
+          <p:cNvSpPr>
+            <a:spLocks noGrp="1"/>
+          </p:cNvSpPr>
+          <p:nvPr>
+            <p:ph idx="1"/>
+          </p:nvPr>
+        </p:nvSpPr>
+        <p:spPr/>
+        <p:txBody>
+          <a:bodyPr/>
+          <a:lstStyle/>
+          <a:p>
+            <a:r>
+              <a:rPr lang="en-US" noProof="1"/>
+              <a:t>Programming exercises on aritmetic and logic operators.</a:t>
+            </a:r>
+          </a:p>
+        </p:txBody>
+      </p:sp>
+    </p:spTree>
+    <p:extLst>
+      <p:ext uri="{BB962C8B-B14F-4D97-AF65-F5344CB8AC3E}">
+        <p14:creationId xmlns:p14="http://schemas.microsoft.com/office/powerpoint/2010/main" val="2966955645"/>
+      </p:ext>
+    </p:extLst>
+  </p:cSld>
+  <p:clrMapOvr>
+    <a:masterClrMapping/>
+  </p:clrMapOvr>
+</p:sld>
+</file>
+
 <file path=ppt/slides/slide2.xml><?xml version="1.0" encoding="utf-8"?>
 <p:sld xmlns:a="http://schemas.openxmlformats.org/drawingml/2006/main" xmlns:r="http://schemas.openxmlformats.org/officeDocument/2006/relationships" xmlns:p="http://schemas.openxmlformats.org/presentationml/2006/main">
   <p:cSld>
@@ -5484,6 +6746,121 @@
     <p:extLst>
       <p:ext uri="{BB962C8B-B14F-4D97-AF65-F5344CB8AC3E}">
         <p14:creationId xmlns:p14="http://schemas.microsoft.com/office/powerpoint/2010/main" val="2385646379"/>
+      </p:ext>
+    </p:extLst>
+  </p:cSld>
+  <p:clrMapOvr>
+    <a:masterClrMapping/>
+  </p:clrMapOvr>
+</p:sld>
+</file>
+
+<file path=ppt/slides/slide9.xml><?xml version="1.0" encoding="utf-8"?>
+<p:sld xmlns:a="http://schemas.openxmlformats.org/drawingml/2006/main" xmlns:r="http://schemas.openxmlformats.org/officeDocument/2006/relationships" xmlns:p="http://schemas.openxmlformats.org/presentationml/2006/main">
+  <p:cSld>
+    <p:spTree>
+      <p:nvGrpSpPr>
+        <p:cNvPr id="1" name=""/>
+        <p:cNvGrpSpPr/>
+        <p:nvPr/>
+      </p:nvGrpSpPr>
+      <p:grpSpPr>
+        <a:xfrm>
+          <a:off x="0" y="0"/>
+          <a:ext cx="0" cy="0"/>
+          <a:chOff x="0" y="0"/>
+          <a:chExt cx="0" cy="0"/>
+        </a:xfrm>
+      </p:grpSpPr>
+      <p:sp>
+        <p:nvSpPr>
+          <p:cNvPr id="2" name="Title 1">
+            <a:extLst>
+              <a:ext uri="{FF2B5EF4-FFF2-40B4-BE49-F238E27FC236}">
+                <a16:creationId xmlns:a16="http://schemas.microsoft.com/office/drawing/2014/main" id="{C886C1FE-4A1F-F33B-C775-8E2E91F317F3}"/>
+              </a:ext>
+            </a:extLst>
+          </p:cNvPr>
+          <p:cNvSpPr>
+            <a:spLocks noGrp="1"/>
+          </p:cNvSpPr>
+          <p:nvPr>
+            <p:ph type="title"/>
+          </p:nvPr>
+        </p:nvSpPr>
+        <p:spPr/>
+        <p:txBody>
+          <a:bodyPr/>
+          <a:lstStyle/>
+          <a:p>
+            <a:r>
+              <a:rPr lang="en-US" noProof="0" dirty="0"/>
+              <a:t>Boolean Algebra</a:t>
+            </a:r>
+          </a:p>
+        </p:txBody>
+      </p:sp>
+      <p:sp>
+        <p:nvSpPr>
+          <p:cNvPr id="3" name="Content Placeholder 2">
+            <a:extLst>
+              <a:ext uri="{FF2B5EF4-FFF2-40B4-BE49-F238E27FC236}">
+                <a16:creationId xmlns:a16="http://schemas.microsoft.com/office/drawing/2014/main" id="{31817C5A-0CEC-FD3A-0160-AB2554C08A8C}"/>
+              </a:ext>
+            </a:extLst>
+          </p:cNvPr>
+          <p:cNvSpPr>
+            <a:spLocks noGrp="1"/>
+          </p:cNvSpPr>
+          <p:nvPr>
+            <p:ph idx="1"/>
+          </p:nvPr>
+        </p:nvSpPr>
+        <p:spPr/>
+        <p:txBody>
+          <a:bodyPr/>
+          <a:lstStyle/>
+          <a:p>
+            <a:r>
+              <a:rPr lang="en-US" noProof="0" dirty="0"/>
+              <a:t>Values can be either True (T) of False (F).</a:t>
+            </a:r>
+          </a:p>
+          <a:p>
+            <a:r>
+              <a:rPr lang="en-US" noProof="0" dirty="0"/>
+              <a:t>In Python there are 3 basic </a:t>
+            </a:r>
+            <a:r>
+              <a:rPr lang="en-US" noProof="0" dirty="0" err="1"/>
+              <a:t>boolean</a:t>
+            </a:r>
+            <a:r>
+              <a:rPr lang="en-US" noProof="0" dirty="0"/>
+              <a:t> algebra operators: and, or, not.</a:t>
+            </a:r>
+          </a:p>
+          <a:p>
+            <a:r>
+              <a:rPr lang="en-US" dirty="0"/>
+              <a:t>Also, any comparison will evaluate to a </a:t>
+            </a:r>
+            <a:r>
+              <a:rPr lang="en-US" dirty="0" err="1"/>
+              <a:t>boolean</a:t>
+            </a:r>
+            <a:r>
+              <a:rPr lang="en-US" dirty="0"/>
+              <a:t> value.</a:t>
+            </a:r>
+            <a:endParaRPr lang="en-US" noProof="0" dirty="0"/>
+          </a:p>
+        </p:txBody>
+      </p:sp>
+    </p:spTree>
+    <p:extLst>
+      <p:ext uri="{BB962C8B-B14F-4D97-AF65-F5344CB8AC3E}">
+        <p14:creationId xmlns:p14="http://schemas.microsoft.com/office/powerpoint/2010/main" val="2746251109"/>
       </p:ext>
     </p:extLst>
   </p:cSld>

</xml_diff>